<commit_message>
The Collatz Conjecture: Small updates to the presentation
</commit_message>
<xml_diff>
--- a/docs/The Simplest Math problem no one can solve.pptx
+++ b/docs/The Simplest Math problem no one can solve.pptx
@@ -833,7 +833,7 @@
   <p:cSld>
     <p:spTree>
       <p:nvGrpSpPr>
-        <p:cNvPr id="178" name="Shape 178"/>
+        <p:cNvPr id="179" name="Shape 179"/>
         <p:cNvGrpSpPr/>
         <p:nvPr/>
       </p:nvGrpSpPr>
@@ -847,7 +847,7 @@
       </p:grpSpPr>
       <p:sp>
         <p:nvSpPr>
-          <p:cNvPr id="179" name="Google Shape;179;g11583324cc6_0_218:notes"/>
+          <p:cNvPr id="180" name="Google Shape;180;g11583324cc6_0_218:notes"/>
           <p:cNvSpPr/>
           <p:nvPr>
             <p:ph idx="2" type="sldImg"/>
@@ -882,7 +882,7 @@
       </p:sp>
       <p:sp>
         <p:nvSpPr>
-          <p:cNvPr id="180" name="Google Shape;180;g11583324cc6_0_218:notes"/>
+          <p:cNvPr id="181" name="Google Shape;181;g11583324cc6_0_218:notes"/>
           <p:cNvSpPr txBox="1"/>
           <p:nvPr>
             <p:ph idx="1" type="body"/>
@@ -932,7 +932,7 @@
   <p:cSld>
     <p:spTree>
       <p:nvGrpSpPr>
-        <p:cNvPr id="184" name="Shape 184"/>
+        <p:cNvPr id="185" name="Shape 185"/>
         <p:cNvGrpSpPr/>
         <p:nvPr/>
       </p:nvGrpSpPr>
@@ -946,7 +946,7 @@
       </p:grpSpPr>
       <p:sp>
         <p:nvSpPr>
-          <p:cNvPr id="185" name="Google Shape;185;g11583324cc6_0_225:notes"/>
+          <p:cNvPr id="186" name="Google Shape;186;g11583324cc6_0_225:notes"/>
           <p:cNvSpPr/>
           <p:nvPr>
             <p:ph idx="2" type="sldImg"/>
@@ -981,7 +981,7 @@
       </p:sp>
       <p:sp>
         <p:nvSpPr>
-          <p:cNvPr id="186" name="Google Shape;186;g11583324cc6_0_225:notes"/>
+          <p:cNvPr id="187" name="Google Shape;187;g11583324cc6_0_225:notes"/>
           <p:cNvSpPr txBox="1"/>
           <p:nvPr>
             <p:ph idx="1" type="body"/>
@@ -1031,7 +1031,7 @@
   <p:cSld>
     <p:spTree>
       <p:nvGrpSpPr>
-        <p:cNvPr id="190" name="Shape 190"/>
+        <p:cNvPr id="191" name="Shape 191"/>
         <p:cNvGrpSpPr/>
         <p:nvPr/>
       </p:nvGrpSpPr>
@@ -1045,7 +1045,7 @@
       </p:grpSpPr>
       <p:sp>
         <p:nvSpPr>
-          <p:cNvPr id="191" name="Google Shape;191;g11583324cc6_0_233:notes"/>
+          <p:cNvPr id="192" name="Google Shape;192;g11583324cc6_0_233:notes"/>
           <p:cNvSpPr/>
           <p:nvPr>
             <p:ph idx="2" type="sldImg"/>
@@ -1080,7 +1080,7 @@
       </p:sp>
       <p:sp>
         <p:nvSpPr>
-          <p:cNvPr id="192" name="Google Shape;192;g11583324cc6_0_233:notes"/>
+          <p:cNvPr id="193" name="Google Shape;193;g11583324cc6_0_233:notes"/>
           <p:cNvSpPr txBox="1"/>
           <p:nvPr>
             <p:ph idx="1" type="body"/>
@@ -1130,7 +1130,7 @@
   <p:cSld>
     <p:spTree>
       <p:nvGrpSpPr>
-        <p:cNvPr id="196" name="Shape 196"/>
+        <p:cNvPr id="197" name="Shape 197"/>
         <p:cNvGrpSpPr/>
         <p:nvPr/>
       </p:nvGrpSpPr>
@@ -1144,7 +1144,7 @@
       </p:grpSpPr>
       <p:sp>
         <p:nvSpPr>
-          <p:cNvPr id="197" name="Google Shape;197;g11583324cc6_0_239:notes"/>
+          <p:cNvPr id="198" name="Google Shape;198;g11583324cc6_0_239:notes"/>
           <p:cNvSpPr/>
           <p:nvPr>
             <p:ph idx="2" type="sldImg"/>
@@ -1179,7 +1179,7 @@
       </p:sp>
       <p:sp>
         <p:nvSpPr>
-          <p:cNvPr id="198" name="Google Shape;198;g11583324cc6_0_239:notes"/>
+          <p:cNvPr id="199" name="Google Shape;199;g11583324cc6_0_239:notes"/>
           <p:cNvSpPr txBox="1"/>
           <p:nvPr>
             <p:ph idx="1" type="body"/>
@@ -1229,7 +1229,7 @@
   <p:cSld>
     <p:spTree>
       <p:nvGrpSpPr>
-        <p:cNvPr id="202" name="Shape 202"/>
+        <p:cNvPr id="203" name="Shape 203"/>
         <p:cNvGrpSpPr/>
         <p:nvPr/>
       </p:nvGrpSpPr>
@@ -1243,7 +1243,7 @@
       </p:grpSpPr>
       <p:sp>
         <p:nvSpPr>
-          <p:cNvPr id="203" name="Google Shape;203;g11583324cc6_0_246:notes"/>
+          <p:cNvPr id="204" name="Google Shape;204;g11583324cc6_0_246:notes"/>
           <p:cNvSpPr/>
           <p:nvPr>
             <p:ph idx="2" type="sldImg"/>
@@ -1278,7 +1278,7 @@
       </p:sp>
       <p:sp>
         <p:nvSpPr>
-          <p:cNvPr id="204" name="Google Shape;204;g11583324cc6_0_246:notes"/>
+          <p:cNvPr id="205" name="Google Shape;205;g11583324cc6_0_246:notes"/>
           <p:cNvSpPr txBox="1"/>
           <p:nvPr>
             <p:ph idx="1" type="body"/>
@@ -1328,7 +1328,7 @@
   <p:cSld>
     <p:spTree>
       <p:nvGrpSpPr>
-        <p:cNvPr id="208" name="Shape 208"/>
+        <p:cNvPr id="209" name="Shape 209"/>
         <p:cNvGrpSpPr/>
         <p:nvPr/>
       </p:nvGrpSpPr>
@@ -1342,7 +1342,7 @@
       </p:grpSpPr>
       <p:sp>
         <p:nvSpPr>
-          <p:cNvPr id="209" name="Google Shape;209;g11583324cc6_0_253:notes"/>
+          <p:cNvPr id="210" name="Google Shape;210;g11583324cc6_0_253:notes"/>
           <p:cNvSpPr/>
           <p:nvPr>
             <p:ph idx="2" type="sldImg"/>
@@ -1377,7 +1377,7 @@
       </p:sp>
       <p:sp>
         <p:nvSpPr>
-          <p:cNvPr id="210" name="Google Shape;210;g11583324cc6_0_253:notes"/>
+          <p:cNvPr id="211" name="Google Shape;211;g11583324cc6_0_253:notes"/>
           <p:cNvSpPr txBox="1"/>
           <p:nvPr>
             <p:ph idx="1" type="body"/>
@@ -1427,7 +1427,7 @@
   <p:cSld>
     <p:spTree>
       <p:nvGrpSpPr>
-        <p:cNvPr id="214" name="Shape 214"/>
+        <p:cNvPr id="215" name="Shape 215"/>
         <p:cNvGrpSpPr/>
         <p:nvPr/>
       </p:nvGrpSpPr>
@@ -1441,7 +1441,7 @@
       </p:grpSpPr>
       <p:sp>
         <p:nvSpPr>
-          <p:cNvPr id="215" name="Google Shape;215;g11583324cc6_0_260:notes"/>
+          <p:cNvPr id="216" name="Google Shape;216;g11583324cc6_0_260:notes"/>
           <p:cNvSpPr/>
           <p:nvPr>
             <p:ph idx="2" type="sldImg"/>
@@ -1476,7 +1476,7 @@
       </p:sp>
       <p:sp>
         <p:nvSpPr>
-          <p:cNvPr id="216" name="Google Shape;216;g11583324cc6_0_260:notes"/>
+          <p:cNvPr id="217" name="Google Shape;217;g11583324cc6_0_260:notes"/>
           <p:cNvSpPr txBox="1"/>
           <p:nvPr>
             <p:ph idx="1" type="body"/>
@@ -1526,7 +1526,7 @@
   <p:cSld>
     <p:spTree>
       <p:nvGrpSpPr>
-        <p:cNvPr id="220" name="Shape 220"/>
+        <p:cNvPr id="221" name="Shape 221"/>
         <p:cNvGrpSpPr/>
         <p:nvPr/>
       </p:nvGrpSpPr>
@@ -1540,7 +1540,7 @@
       </p:grpSpPr>
       <p:sp>
         <p:nvSpPr>
-          <p:cNvPr id="221" name="Google Shape;221;g11583324cc6_0_266:notes"/>
+          <p:cNvPr id="222" name="Google Shape;222;g11583324cc6_0_266:notes"/>
           <p:cNvSpPr/>
           <p:nvPr>
             <p:ph idx="2" type="sldImg"/>
@@ -1575,7 +1575,7 @@
       </p:sp>
       <p:sp>
         <p:nvSpPr>
-          <p:cNvPr id="222" name="Google Shape;222;g11583324cc6_0_266:notes"/>
+          <p:cNvPr id="223" name="Google Shape;223;g11583324cc6_0_266:notes"/>
           <p:cNvSpPr txBox="1"/>
           <p:nvPr>
             <p:ph idx="1" type="body"/>
@@ -1625,7 +1625,7 @@
   <p:cSld>
     <p:spTree>
       <p:nvGrpSpPr>
-        <p:cNvPr id="226" name="Shape 226"/>
+        <p:cNvPr id="227" name="Shape 227"/>
         <p:cNvGrpSpPr/>
         <p:nvPr/>
       </p:nvGrpSpPr>
@@ -1639,7 +1639,7 @@
       </p:grpSpPr>
       <p:sp>
         <p:nvSpPr>
-          <p:cNvPr id="227" name="Google Shape;227;g11583324cc6_0_273:notes"/>
+          <p:cNvPr id="228" name="Google Shape;228;g11583324cc6_0_273:notes"/>
           <p:cNvSpPr/>
           <p:nvPr>
             <p:ph idx="2" type="sldImg"/>
@@ -1674,7 +1674,7 @@
       </p:sp>
       <p:sp>
         <p:nvSpPr>
-          <p:cNvPr id="228" name="Google Shape;228;g11583324cc6_0_273:notes"/>
+          <p:cNvPr id="229" name="Google Shape;229;g11583324cc6_0_273:notes"/>
           <p:cNvSpPr txBox="1"/>
           <p:nvPr>
             <p:ph idx="1" type="body"/>
@@ -1724,7 +1724,7 @@
   <p:cSld>
     <p:spTree>
       <p:nvGrpSpPr>
-        <p:cNvPr id="232" name="Shape 232"/>
+        <p:cNvPr id="233" name="Shape 233"/>
         <p:cNvGrpSpPr/>
         <p:nvPr/>
       </p:nvGrpSpPr>
@@ -1738,7 +1738,7 @@
       </p:grpSpPr>
       <p:sp>
         <p:nvSpPr>
-          <p:cNvPr id="233" name="Google Shape;233;g11583324cc6_0_280:notes"/>
+          <p:cNvPr id="234" name="Google Shape;234;g11583324cc6_0_280:notes"/>
           <p:cNvSpPr/>
           <p:nvPr>
             <p:ph idx="2" type="sldImg"/>
@@ -1773,7 +1773,7 @@
       </p:sp>
       <p:sp>
         <p:nvSpPr>
-          <p:cNvPr id="234" name="Google Shape;234;g11583324cc6_0_280:notes"/>
+          <p:cNvPr id="235" name="Google Shape;235;g11583324cc6_0_280:notes"/>
           <p:cNvSpPr txBox="1"/>
           <p:nvPr>
             <p:ph idx="1" type="body"/>
@@ -1823,7 +1823,7 @@
   <p:cSld>
     <p:spTree>
       <p:nvGrpSpPr>
-        <p:cNvPr id="135" name="Shape 135"/>
+        <p:cNvPr id="136" name="Shape 136"/>
         <p:cNvGrpSpPr/>
         <p:nvPr/>
       </p:nvGrpSpPr>
@@ -1837,7 +1837,7 @@
       </p:grpSpPr>
       <p:sp>
         <p:nvSpPr>
-          <p:cNvPr id="136" name="Google Shape;136;g11583324cc6_0_171:notes"/>
+          <p:cNvPr id="137" name="Google Shape;137;g11583324cc6_0_171:notes"/>
           <p:cNvSpPr/>
           <p:nvPr>
             <p:ph idx="2" type="sldImg"/>
@@ -1872,7 +1872,7 @@
       </p:sp>
       <p:sp>
         <p:nvSpPr>
-          <p:cNvPr id="137" name="Google Shape;137;g11583324cc6_0_171:notes"/>
+          <p:cNvPr id="138" name="Google Shape;138;g11583324cc6_0_171:notes"/>
           <p:cNvSpPr txBox="1"/>
           <p:nvPr>
             <p:ph idx="1" type="body"/>
@@ -1922,7 +1922,7 @@
   <p:cSld>
     <p:spTree>
       <p:nvGrpSpPr>
-        <p:cNvPr id="238" name="Shape 238"/>
+        <p:cNvPr id="239" name="Shape 239"/>
         <p:cNvGrpSpPr/>
         <p:nvPr/>
       </p:nvGrpSpPr>
@@ -1936,7 +1936,7 @@
       </p:grpSpPr>
       <p:sp>
         <p:nvSpPr>
-          <p:cNvPr id="239" name="Google Shape;239;g11583324cc6_0_286:notes"/>
+          <p:cNvPr id="240" name="Google Shape;240;g11583324cc6_0_286:notes"/>
           <p:cNvSpPr/>
           <p:nvPr>
             <p:ph idx="2" type="sldImg"/>
@@ -1971,7 +1971,7 @@
       </p:sp>
       <p:sp>
         <p:nvSpPr>
-          <p:cNvPr id="240" name="Google Shape;240;g11583324cc6_0_286:notes"/>
+          <p:cNvPr id="241" name="Google Shape;241;g11583324cc6_0_286:notes"/>
           <p:cNvSpPr txBox="1"/>
           <p:nvPr>
             <p:ph idx="1" type="body"/>
@@ -2021,7 +2021,7 @@
   <p:cSld>
     <p:spTree>
       <p:nvGrpSpPr>
-        <p:cNvPr id="244" name="Shape 244"/>
+        <p:cNvPr id="245" name="Shape 245"/>
         <p:cNvGrpSpPr/>
         <p:nvPr/>
       </p:nvGrpSpPr>
@@ -2035,7 +2035,7 @@
       </p:grpSpPr>
       <p:sp>
         <p:nvSpPr>
-          <p:cNvPr id="245" name="Google Shape;245;g11583324cc6_0_294:notes"/>
+          <p:cNvPr id="246" name="Google Shape;246;g11583324cc6_0_294:notes"/>
           <p:cNvSpPr/>
           <p:nvPr>
             <p:ph idx="2" type="sldImg"/>
@@ -2070,7 +2070,7 @@
       </p:sp>
       <p:sp>
         <p:nvSpPr>
-          <p:cNvPr id="246" name="Google Shape;246;g11583324cc6_0_294:notes"/>
+          <p:cNvPr id="247" name="Google Shape;247;g11583324cc6_0_294:notes"/>
           <p:cNvSpPr txBox="1"/>
           <p:nvPr>
             <p:ph idx="1" type="body"/>
@@ -2120,7 +2120,7 @@
   <p:cSld>
     <p:spTree>
       <p:nvGrpSpPr>
-        <p:cNvPr id="250" name="Shape 250"/>
+        <p:cNvPr id="251" name="Shape 251"/>
         <p:cNvGrpSpPr/>
         <p:nvPr/>
       </p:nvGrpSpPr>
@@ -2134,7 +2134,7 @@
       </p:grpSpPr>
       <p:sp>
         <p:nvSpPr>
-          <p:cNvPr id="251" name="Google Shape;251;g11583324cc6_0_300:notes"/>
+          <p:cNvPr id="252" name="Google Shape;252;g11583324cc6_0_300:notes"/>
           <p:cNvSpPr/>
           <p:nvPr>
             <p:ph idx="2" type="sldImg"/>
@@ -2169,7 +2169,7 @@
       </p:sp>
       <p:sp>
         <p:nvSpPr>
-          <p:cNvPr id="252" name="Google Shape;252;g11583324cc6_0_300:notes"/>
+          <p:cNvPr id="253" name="Google Shape;253;g11583324cc6_0_300:notes"/>
           <p:cNvSpPr txBox="1"/>
           <p:nvPr>
             <p:ph idx="1" type="body"/>
@@ -2219,7 +2219,7 @@
   <p:cSld>
     <p:spTree>
       <p:nvGrpSpPr>
-        <p:cNvPr id="257" name="Shape 257"/>
+        <p:cNvPr id="258" name="Shape 258"/>
         <p:cNvGrpSpPr/>
         <p:nvPr/>
       </p:nvGrpSpPr>
@@ -2233,7 +2233,7 @@
       </p:grpSpPr>
       <p:sp>
         <p:nvSpPr>
-          <p:cNvPr id="258" name="Google Shape;258;g11583324cc6_0_306:notes"/>
+          <p:cNvPr id="259" name="Google Shape;259;g11583324cc6_0_306:notes"/>
           <p:cNvSpPr/>
           <p:nvPr>
             <p:ph idx="2" type="sldImg"/>
@@ -2268,7 +2268,7 @@
       </p:sp>
       <p:sp>
         <p:nvSpPr>
-          <p:cNvPr id="259" name="Google Shape;259;g11583324cc6_0_306:notes"/>
+          <p:cNvPr id="260" name="Google Shape;260;g11583324cc6_0_306:notes"/>
           <p:cNvSpPr txBox="1"/>
           <p:nvPr>
             <p:ph idx="1" type="body"/>
@@ -2318,7 +2318,7 @@
   <p:cSld>
     <p:spTree>
       <p:nvGrpSpPr>
-        <p:cNvPr id="264" name="Shape 264"/>
+        <p:cNvPr id="265" name="Shape 265"/>
         <p:cNvGrpSpPr/>
         <p:nvPr/>
       </p:nvGrpSpPr>
@@ -2332,7 +2332,7 @@
       </p:grpSpPr>
       <p:sp>
         <p:nvSpPr>
-          <p:cNvPr id="265" name="Google Shape;265;g11583324cc6_0_312:notes"/>
+          <p:cNvPr id="266" name="Google Shape;266;g11583324cc6_0_312:notes"/>
           <p:cNvSpPr/>
           <p:nvPr>
             <p:ph idx="2" type="sldImg"/>
@@ -2367,7 +2367,7 @@
       </p:sp>
       <p:sp>
         <p:nvSpPr>
-          <p:cNvPr id="266" name="Google Shape;266;g11583324cc6_0_312:notes"/>
+          <p:cNvPr id="267" name="Google Shape;267;g11583324cc6_0_312:notes"/>
           <p:cNvSpPr txBox="1"/>
           <p:nvPr>
             <p:ph idx="1" type="body"/>
@@ -2417,7 +2417,7 @@
   <p:cSld>
     <p:spTree>
       <p:nvGrpSpPr>
-        <p:cNvPr id="271" name="Shape 271"/>
+        <p:cNvPr id="272" name="Shape 272"/>
         <p:cNvGrpSpPr/>
         <p:nvPr/>
       </p:nvGrpSpPr>
@@ -2431,7 +2431,7 @@
       </p:grpSpPr>
       <p:sp>
         <p:nvSpPr>
-          <p:cNvPr id="272" name="Google Shape;272;g11583324cc6_0_318:notes"/>
+          <p:cNvPr id="273" name="Google Shape;273;g11583324cc6_0_318:notes"/>
           <p:cNvSpPr/>
           <p:nvPr>
             <p:ph idx="2" type="sldImg"/>
@@ -2466,7 +2466,7 @@
       </p:sp>
       <p:sp>
         <p:nvSpPr>
-          <p:cNvPr id="273" name="Google Shape;273;g11583324cc6_0_318:notes"/>
+          <p:cNvPr id="274" name="Google Shape;274;g11583324cc6_0_318:notes"/>
           <p:cNvSpPr txBox="1"/>
           <p:nvPr>
             <p:ph idx="1" type="body"/>
@@ -2516,7 +2516,7 @@
   <p:cSld>
     <p:spTree>
       <p:nvGrpSpPr>
-        <p:cNvPr id="277" name="Shape 277"/>
+        <p:cNvPr id="278" name="Shape 278"/>
         <p:cNvGrpSpPr/>
         <p:nvPr/>
       </p:nvGrpSpPr>
@@ -2530,7 +2530,7 @@
       </p:grpSpPr>
       <p:sp>
         <p:nvSpPr>
-          <p:cNvPr id="278" name="Google Shape;278;g11583324cc6_0_326:notes"/>
+          <p:cNvPr id="279" name="Google Shape;279;g11583324cc6_0_326:notes"/>
           <p:cNvSpPr/>
           <p:nvPr>
             <p:ph idx="2" type="sldImg"/>
@@ -2565,7 +2565,7 @@
       </p:sp>
       <p:sp>
         <p:nvSpPr>
-          <p:cNvPr id="279" name="Google Shape;279;g11583324cc6_0_326:notes"/>
+          <p:cNvPr id="280" name="Google Shape;280;g11583324cc6_0_326:notes"/>
           <p:cNvSpPr txBox="1"/>
           <p:nvPr>
             <p:ph idx="1" type="body"/>
@@ -2615,7 +2615,7 @@
   <p:cSld>
     <p:spTree>
       <p:nvGrpSpPr>
-        <p:cNvPr id="283" name="Shape 283"/>
+        <p:cNvPr id="284" name="Shape 284"/>
         <p:cNvGrpSpPr/>
         <p:nvPr/>
       </p:nvGrpSpPr>
@@ -2629,7 +2629,7 @@
       </p:grpSpPr>
       <p:sp>
         <p:nvSpPr>
-          <p:cNvPr id="284" name="Google Shape;284;g11583324cc6_0_333:notes"/>
+          <p:cNvPr id="285" name="Google Shape;285;g11583324cc6_0_333:notes"/>
           <p:cNvSpPr/>
           <p:nvPr>
             <p:ph idx="2" type="sldImg"/>
@@ -2664,7 +2664,7 @@
       </p:sp>
       <p:sp>
         <p:nvSpPr>
-          <p:cNvPr id="285" name="Google Shape;285;g11583324cc6_0_333:notes"/>
+          <p:cNvPr id="286" name="Google Shape;286;g11583324cc6_0_333:notes"/>
           <p:cNvSpPr txBox="1"/>
           <p:nvPr>
             <p:ph idx="1" type="body"/>
@@ -2714,7 +2714,7 @@
   <p:cSld>
     <p:spTree>
       <p:nvGrpSpPr>
-        <p:cNvPr id="289" name="Shape 289"/>
+        <p:cNvPr id="290" name="Shape 290"/>
         <p:cNvGrpSpPr/>
         <p:nvPr/>
       </p:nvGrpSpPr>
@@ -2728,7 +2728,7 @@
       </p:grpSpPr>
       <p:sp>
         <p:nvSpPr>
-          <p:cNvPr id="290" name="Google Shape;290;g11583324cc6_0_339:notes"/>
+          <p:cNvPr id="291" name="Google Shape;291;g11583324cc6_0_339:notes"/>
           <p:cNvSpPr/>
           <p:nvPr>
             <p:ph idx="2" type="sldImg"/>
@@ -2763,7 +2763,7 @@
       </p:sp>
       <p:sp>
         <p:nvSpPr>
-          <p:cNvPr id="291" name="Google Shape;291;g11583324cc6_0_339:notes"/>
+          <p:cNvPr id="292" name="Google Shape;292;g11583324cc6_0_339:notes"/>
           <p:cNvSpPr txBox="1"/>
           <p:nvPr>
             <p:ph idx="1" type="body"/>
@@ -2813,7 +2813,7 @@
   <p:cSld>
     <p:spTree>
       <p:nvGrpSpPr>
-        <p:cNvPr id="140" name="Shape 140"/>
+        <p:cNvPr id="141" name="Shape 141"/>
         <p:cNvGrpSpPr/>
         <p:nvPr/>
       </p:nvGrpSpPr>
@@ -2827,7 +2827,7 @@
       </p:grpSpPr>
       <p:sp>
         <p:nvSpPr>
-          <p:cNvPr id="141" name="Google Shape;141;g11583324cc6_0_178:notes"/>
+          <p:cNvPr id="142" name="Google Shape;142;g11583324cc6_0_178:notes"/>
           <p:cNvSpPr/>
           <p:nvPr>
             <p:ph idx="2" type="sldImg"/>
@@ -2862,7 +2862,7 @@
       </p:sp>
       <p:sp>
         <p:nvSpPr>
-          <p:cNvPr id="142" name="Google Shape;142;g11583324cc6_0_178:notes"/>
+          <p:cNvPr id="143" name="Google Shape;143;g11583324cc6_0_178:notes"/>
           <p:cNvSpPr txBox="1"/>
           <p:nvPr>
             <p:ph idx="1" type="body"/>
@@ -2912,7 +2912,7 @@
   <p:cSld>
     <p:spTree>
       <p:nvGrpSpPr>
-        <p:cNvPr id="145" name="Shape 145"/>
+        <p:cNvPr id="146" name="Shape 146"/>
         <p:cNvGrpSpPr/>
         <p:nvPr/>
       </p:nvGrpSpPr>
@@ -2926,7 +2926,7 @@
       </p:grpSpPr>
       <p:sp>
         <p:nvSpPr>
-          <p:cNvPr id="146" name="Google Shape;146;g11583324cc6_0_184:notes"/>
+          <p:cNvPr id="147" name="Google Shape;147;g11583324cc6_0_184:notes"/>
           <p:cNvSpPr/>
           <p:nvPr>
             <p:ph idx="2" type="sldImg"/>
@@ -2961,7 +2961,7 @@
       </p:sp>
       <p:sp>
         <p:nvSpPr>
-          <p:cNvPr id="147" name="Google Shape;147;g11583324cc6_0_184:notes"/>
+          <p:cNvPr id="148" name="Google Shape;148;g11583324cc6_0_184:notes"/>
           <p:cNvSpPr txBox="1"/>
           <p:nvPr>
             <p:ph idx="1" type="body"/>
@@ -3011,7 +3011,7 @@
   <p:cSld>
     <p:spTree>
       <p:nvGrpSpPr>
-        <p:cNvPr id="150" name="Shape 150"/>
+        <p:cNvPr id="151" name="Shape 151"/>
         <p:cNvGrpSpPr/>
         <p:nvPr/>
       </p:nvGrpSpPr>
@@ -3025,7 +3025,7 @@
       </p:grpSpPr>
       <p:sp>
         <p:nvSpPr>
-          <p:cNvPr id="151" name="Google Shape;151;g11583324cc6_0_189:notes"/>
+          <p:cNvPr id="152" name="Google Shape;152;g11583324cc6_0_189:notes"/>
           <p:cNvSpPr/>
           <p:nvPr>
             <p:ph idx="2" type="sldImg"/>
@@ -3060,7 +3060,7 @@
       </p:sp>
       <p:sp>
         <p:nvSpPr>
-          <p:cNvPr id="152" name="Google Shape;152;g11583324cc6_0_189:notes"/>
+          <p:cNvPr id="153" name="Google Shape;153;g11583324cc6_0_189:notes"/>
           <p:cNvSpPr txBox="1"/>
           <p:nvPr>
             <p:ph idx="1" type="body"/>
@@ -3110,7 +3110,7 @@
   <p:cSld>
     <p:spTree>
       <p:nvGrpSpPr>
-        <p:cNvPr id="155" name="Shape 155"/>
+        <p:cNvPr id="156" name="Shape 156"/>
         <p:cNvGrpSpPr/>
         <p:nvPr/>
       </p:nvGrpSpPr>
@@ -3124,7 +3124,7 @@
       </p:grpSpPr>
       <p:sp>
         <p:nvSpPr>
-          <p:cNvPr id="156" name="Google Shape;156;g11583324cc6_0_194:notes"/>
+          <p:cNvPr id="157" name="Google Shape;157;g11583324cc6_0_194:notes"/>
           <p:cNvSpPr/>
           <p:nvPr>
             <p:ph idx="2" type="sldImg"/>
@@ -3159,7 +3159,7 @@
       </p:sp>
       <p:sp>
         <p:nvSpPr>
-          <p:cNvPr id="157" name="Google Shape;157;g11583324cc6_0_194:notes"/>
+          <p:cNvPr id="158" name="Google Shape;158;g11583324cc6_0_194:notes"/>
           <p:cNvSpPr txBox="1"/>
           <p:nvPr>
             <p:ph idx="1" type="body"/>
@@ -3209,7 +3209,7 @@
   <p:cSld>
     <p:spTree>
       <p:nvGrpSpPr>
-        <p:cNvPr id="160" name="Shape 160"/>
+        <p:cNvPr id="161" name="Shape 161"/>
         <p:cNvGrpSpPr/>
         <p:nvPr/>
       </p:nvGrpSpPr>
@@ -3223,7 +3223,7 @@
       </p:grpSpPr>
       <p:sp>
         <p:nvSpPr>
-          <p:cNvPr id="161" name="Google Shape;161;g11583324cc6_0_199:notes"/>
+          <p:cNvPr id="162" name="Google Shape;162;g11583324cc6_0_199:notes"/>
           <p:cNvSpPr/>
           <p:nvPr>
             <p:ph idx="2" type="sldImg"/>
@@ -3258,7 +3258,7 @@
       </p:sp>
       <p:sp>
         <p:nvSpPr>
-          <p:cNvPr id="162" name="Google Shape;162;g11583324cc6_0_199:notes"/>
+          <p:cNvPr id="163" name="Google Shape;163;g11583324cc6_0_199:notes"/>
           <p:cNvSpPr txBox="1"/>
           <p:nvPr>
             <p:ph idx="1" type="body"/>
@@ -3308,7 +3308,7 @@
   <p:cSld>
     <p:spTree>
       <p:nvGrpSpPr>
-        <p:cNvPr id="166" name="Shape 166"/>
+        <p:cNvPr id="167" name="Shape 167"/>
         <p:cNvGrpSpPr/>
         <p:nvPr/>
       </p:nvGrpSpPr>
@@ -3322,7 +3322,7 @@
       </p:grpSpPr>
       <p:sp>
         <p:nvSpPr>
-          <p:cNvPr id="167" name="Google Shape;167;g11583324cc6_0_205:notes"/>
+          <p:cNvPr id="168" name="Google Shape;168;g11583324cc6_0_205:notes"/>
           <p:cNvSpPr/>
           <p:nvPr>
             <p:ph idx="2" type="sldImg"/>
@@ -3357,7 +3357,7 @@
       </p:sp>
       <p:sp>
         <p:nvSpPr>
-          <p:cNvPr id="168" name="Google Shape;168;g11583324cc6_0_205:notes"/>
+          <p:cNvPr id="169" name="Google Shape;169;g11583324cc6_0_205:notes"/>
           <p:cNvSpPr txBox="1"/>
           <p:nvPr>
             <p:ph idx="1" type="body"/>
@@ -3407,7 +3407,7 @@
   <p:cSld>
     <p:spTree>
       <p:nvGrpSpPr>
-        <p:cNvPr id="172" name="Shape 172"/>
+        <p:cNvPr id="173" name="Shape 173"/>
         <p:cNvGrpSpPr/>
         <p:nvPr/>
       </p:nvGrpSpPr>
@@ -3421,7 +3421,7 @@
       </p:grpSpPr>
       <p:sp>
         <p:nvSpPr>
-          <p:cNvPr id="173" name="Google Shape;173;g11583324cc6_0_212:notes"/>
+          <p:cNvPr id="174" name="Google Shape;174;g11583324cc6_0_212:notes"/>
           <p:cNvSpPr/>
           <p:nvPr>
             <p:ph idx="2" type="sldImg"/>
@@ -3456,7 +3456,7 @@
       </p:sp>
       <p:sp>
         <p:nvSpPr>
-          <p:cNvPr id="174" name="Google Shape;174;g11583324cc6_0_212:notes"/>
+          <p:cNvPr id="175" name="Google Shape;175;g11583324cc6_0_212:notes"/>
           <p:cNvSpPr txBox="1"/>
           <p:nvPr>
             <p:ph idx="1" type="body"/>
@@ -11741,6 +11741,64 @@
           </a:p>
         </p:txBody>
       </p:sp>
+      <p:sp>
+        <p:nvSpPr>
+          <p:cNvPr id="135" name="Google Shape;135;p13"/>
+          <p:cNvSpPr txBox="1"/>
+          <p:nvPr/>
+        </p:nvSpPr>
+        <p:spPr>
+          <a:xfrm>
+            <a:off x="3551174" y="3639200"/>
+            <a:ext cx="4586100" cy="400200"/>
+          </a:xfrm>
+          <a:prstGeom prst="rect">
+            <a:avLst/>
+          </a:prstGeom>
+          <a:noFill/>
+          <a:ln>
+            <a:noFill/>
+          </a:ln>
+        </p:spPr>
+        <p:txBody>
+          <a:bodyPr anchorCtr="0" anchor="t" bIns="91425" lIns="91425" spcFirstLastPara="1" rIns="91425" wrap="square" tIns="91425">
+            <a:spAutoFit/>
+          </a:bodyPr>
+          <a:lstStyle/>
+          <a:p>
+            <a:pPr indent="0" lvl="0" marL="0" rtl="0" algn="l">
+              <a:spcBef>
+                <a:spcPts val="0"/>
+              </a:spcBef>
+              <a:spcAft>
+                <a:spcPts val="0"/>
+              </a:spcAft>
+              <a:buNone/>
+            </a:pPr>
+            <a:r>
+              <a:rPr lang="en">
+                <a:solidFill>
+                  <a:schemeClr val="lt1"/>
+                </a:solidFill>
+                <a:latin typeface="Lato"/>
+                <a:ea typeface="Lato"/>
+                <a:cs typeface="Lato"/>
+                <a:sym typeface="Lato"/>
+              </a:rPr>
+              <a:t>Presented by: Damyan Mirchev</a:t>
+            </a:r>
+            <a:endParaRPr>
+              <a:solidFill>
+                <a:schemeClr val="lt1"/>
+              </a:solidFill>
+              <a:latin typeface="Lato"/>
+              <a:ea typeface="Lato"/>
+              <a:cs typeface="Lato"/>
+              <a:sym typeface="Lato"/>
+            </a:endParaRPr>
+          </a:p>
+        </p:txBody>
+      </p:sp>
     </p:spTree>
   </p:cSld>
   <p:clrMapOvr>
@@ -11754,7 +11812,7 @@
   <p:cSld>
     <p:spTree>
       <p:nvGrpSpPr>
-        <p:cNvPr id="181" name="Shape 181"/>
+        <p:cNvPr id="182" name="Shape 182"/>
         <p:cNvGrpSpPr/>
         <p:nvPr/>
       </p:nvGrpSpPr>
@@ -11768,7 +11826,7 @@
       </p:grpSpPr>
       <p:sp>
         <p:nvSpPr>
-          <p:cNvPr id="182" name="Google Shape;182;p22"/>
+          <p:cNvPr id="183" name="Google Shape;183;p22"/>
           <p:cNvSpPr txBox="1"/>
           <p:nvPr>
             <p:ph type="title"/>
@@ -11808,7 +11866,7 @@
       </p:sp>
       <p:sp>
         <p:nvSpPr>
-          <p:cNvPr id="183" name="Google Shape;183;p22"/>
+          <p:cNvPr id="184" name="Google Shape;184;p22"/>
           <p:cNvSpPr txBox="1"/>
           <p:nvPr>
             <p:ph idx="1" type="body"/>
@@ -11912,7 +11970,7 @@
   <p:cSld>
     <p:spTree>
       <p:nvGrpSpPr>
-        <p:cNvPr id="187" name="Shape 187"/>
+        <p:cNvPr id="188" name="Shape 188"/>
         <p:cNvGrpSpPr/>
         <p:nvPr/>
       </p:nvGrpSpPr>
@@ -11926,7 +11984,7 @@
       </p:grpSpPr>
       <p:sp>
         <p:nvSpPr>
-          <p:cNvPr id="188" name="Google Shape;188;p23"/>
+          <p:cNvPr id="189" name="Google Shape;189;p23"/>
           <p:cNvSpPr txBox="1"/>
           <p:nvPr>
             <p:ph type="title"/>
@@ -11978,7 +12036,7 @@
       </p:sp>
       <p:sp>
         <p:nvSpPr>
-          <p:cNvPr id="189" name="Google Shape;189;p23"/>
+          <p:cNvPr id="190" name="Google Shape;190;p23"/>
           <p:cNvSpPr txBox="1"/>
           <p:nvPr>
             <p:ph idx="1" type="body"/>
@@ -12196,7 +12254,7 @@
   <p:cSld>
     <p:spTree>
       <p:nvGrpSpPr>
-        <p:cNvPr id="193" name="Shape 193"/>
+        <p:cNvPr id="194" name="Shape 194"/>
         <p:cNvGrpSpPr/>
         <p:nvPr/>
       </p:nvGrpSpPr>
@@ -12210,7 +12268,7 @@
       </p:grpSpPr>
       <p:sp>
         <p:nvSpPr>
-          <p:cNvPr id="194" name="Google Shape;194;p24"/>
+          <p:cNvPr id="195" name="Google Shape;195;p24"/>
           <p:cNvSpPr txBox="1"/>
           <p:nvPr>
             <p:ph type="title"/>
@@ -12250,7 +12308,7 @@
       </p:sp>
       <p:sp>
         <p:nvSpPr>
-          <p:cNvPr id="195" name="Google Shape;195;p24"/>
+          <p:cNvPr id="196" name="Google Shape;196;p24"/>
           <p:cNvSpPr txBox="1"/>
           <p:nvPr>
             <p:ph idx="1" type="body"/>
@@ -12364,7 +12422,7 @@
   <p:cSld>
     <p:spTree>
       <p:nvGrpSpPr>
-        <p:cNvPr id="199" name="Shape 199"/>
+        <p:cNvPr id="200" name="Shape 200"/>
         <p:cNvGrpSpPr/>
         <p:nvPr/>
       </p:nvGrpSpPr>
@@ -12378,7 +12436,7 @@
       </p:grpSpPr>
       <p:sp>
         <p:nvSpPr>
-          <p:cNvPr id="200" name="Google Shape;200;p25"/>
+          <p:cNvPr id="201" name="Google Shape;201;p25"/>
           <p:cNvSpPr txBox="1"/>
           <p:nvPr>
             <p:ph type="title"/>
@@ -12418,7 +12476,7 @@
       </p:sp>
       <p:sp>
         <p:nvSpPr>
-          <p:cNvPr id="201" name="Google Shape;201;p25"/>
+          <p:cNvPr id="202" name="Google Shape;202;p25"/>
           <p:cNvSpPr txBox="1"/>
           <p:nvPr>
             <p:ph idx="1" type="body"/>
@@ -12513,7 +12571,7 @@
   <p:cSld>
     <p:spTree>
       <p:nvGrpSpPr>
-        <p:cNvPr id="205" name="Shape 205"/>
+        <p:cNvPr id="206" name="Shape 206"/>
         <p:cNvGrpSpPr/>
         <p:nvPr/>
       </p:nvGrpSpPr>
@@ -12527,7 +12585,7 @@
       </p:grpSpPr>
       <p:sp>
         <p:nvSpPr>
-          <p:cNvPr id="206" name="Google Shape;206;p26"/>
+          <p:cNvPr id="207" name="Google Shape;207;p26"/>
           <p:cNvSpPr txBox="1"/>
           <p:nvPr>
             <p:ph type="title"/>
@@ -12567,7 +12625,7 @@
       </p:sp>
       <p:sp>
         <p:nvSpPr>
-          <p:cNvPr id="207" name="Google Shape;207;p26"/>
+          <p:cNvPr id="208" name="Google Shape;208;p26"/>
           <p:cNvSpPr txBox="1"/>
           <p:nvPr>
             <p:ph idx="1" type="body"/>
@@ -12671,7 +12729,7 @@
   <p:cSld>
     <p:spTree>
       <p:nvGrpSpPr>
-        <p:cNvPr id="211" name="Shape 211"/>
+        <p:cNvPr id="212" name="Shape 212"/>
         <p:cNvGrpSpPr/>
         <p:nvPr/>
       </p:nvGrpSpPr>
@@ -12685,7 +12743,7 @@
       </p:grpSpPr>
       <p:sp>
         <p:nvSpPr>
-          <p:cNvPr id="212" name="Google Shape;212;p27"/>
+          <p:cNvPr id="213" name="Google Shape;213;p27"/>
           <p:cNvSpPr txBox="1"/>
           <p:nvPr>
             <p:ph type="title"/>
@@ -12725,7 +12783,7 @@
       </p:sp>
       <p:sp>
         <p:nvSpPr>
-          <p:cNvPr id="213" name="Google Shape;213;p27"/>
+          <p:cNvPr id="214" name="Google Shape;214;p27"/>
           <p:cNvSpPr txBox="1"/>
           <p:nvPr>
             <p:ph idx="1" type="body"/>
@@ -12848,7 +12906,7 @@
   <p:cSld>
     <p:spTree>
       <p:nvGrpSpPr>
-        <p:cNvPr id="217" name="Shape 217"/>
+        <p:cNvPr id="218" name="Shape 218"/>
         <p:cNvGrpSpPr/>
         <p:nvPr/>
       </p:nvGrpSpPr>
@@ -12862,7 +12920,7 @@
       </p:grpSpPr>
       <p:sp>
         <p:nvSpPr>
-          <p:cNvPr id="218" name="Google Shape;218;p28"/>
+          <p:cNvPr id="219" name="Google Shape;219;p28"/>
           <p:cNvSpPr txBox="1"/>
           <p:nvPr>
             <p:ph type="title"/>
@@ -12902,7 +12960,7 @@
       </p:sp>
       <p:sp>
         <p:nvSpPr>
-          <p:cNvPr id="219" name="Google Shape;219;p28"/>
+          <p:cNvPr id="220" name="Google Shape;220;p28"/>
           <p:cNvSpPr txBox="1"/>
           <p:nvPr>
             <p:ph idx="1" type="body"/>
@@ -12997,7 +13055,7 @@
   <p:cSld>
     <p:spTree>
       <p:nvGrpSpPr>
-        <p:cNvPr id="223" name="Shape 223"/>
+        <p:cNvPr id="224" name="Shape 224"/>
         <p:cNvGrpSpPr/>
         <p:nvPr/>
       </p:nvGrpSpPr>
@@ -13011,7 +13069,7 @@
       </p:grpSpPr>
       <p:sp>
         <p:nvSpPr>
-          <p:cNvPr id="224" name="Google Shape;224;p29"/>
+          <p:cNvPr id="225" name="Google Shape;225;p29"/>
           <p:cNvSpPr txBox="1"/>
           <p:nvPr>
             <p:ph type="title"/>
@@ -13051,7 +13109,7 @@
       </p:sp>
       <p:sp>
         <p:nvSpPr>
-          <p:cNvPr id="225" name="Google Shape;225;p29"/>
+          <p:cNvPr id="226" name="Google Shape;226;p29"/>
           <p:cNvSpPr txBox="1"/>
           <p:nvPr>
             <p:ph idx="1" type="body"/>
@@ -13182,7 +13240,7 @@
   <p:cSld>
     <p:spTree>
       <p:nvGrpSpPr>
-        <p:cNvPr id="229" name="Shape 229"/>
+        <p:cNvPr id="230" name="Shape 230"/>
         <p:cNvGrpSpPr/>
         <p:nvPr/>
       </p:nvGrpSpPr>
@@ -13196,7 +13254,7 @@
       </p:grpSpPr>
       <p:sp>
         <p:nvSpPr>
-          <p:cNvPr id="230" name="Google Shape;230;p30"/>
+          <p:cNvPr id="231" name="Google Shape;231;p30"/>
           <p:cNvSpPr txBox="1"/>
           <p:nvPr>
             <p:ph type="title"/>
@@ -13236,7 +13294,7 @@
       </p:sp>
       <p:sp>
         <p:nvSpPr>
-          <p:cNvPr id="231" name="Google Shape;231;p30"/>
+          <p:cNvPr id="232" name="Google Shape;232;p30"/>
           <p:cNvSpPr txBox="1"/>
           <p:nvPr>
             <p:ph idx="1" type="body"/>
@@ -13421,7 +13479,7 @@
   <p:cSld>
     <p:spTree>
       <p:nvGrpSpPr>
-        <p:cNvPr id="235" name="Shape 235"/>
+        <p:cNvPr id="236" name="Shape 236"/>
         <p:cNvGrpSpPr/>
         <p:nvPr/>
       </p:nvGrpSpPr>
@@ -13435,7 +13493,7 @@
       </p:grpSpPr>
       <p:sp>
         <p:nvSpPr>
-          <p:cNvPr id="236" name="Google Shape;236;p31"/>
+          <p:cNvPr id="237" name="Google Shape;237;p31"/>
           <p:cNvSpPr txBox="1"/>
           <p:nvPr>
             <p:ph type="title"/>
@@ -13490,7 +13548,7 @@
       </p:sp>
       <p:sp>
         <p:nvSpPr>
-          <p:cNvPr id="237" name="Google Shape;237;p31"/>
+          <p:cNvPr id="238" name="Google Shape;238;p31"/>
           <p:cNvSpPr txBox="1"/>
           <p:nvPr>
             <p:ph idx="1" type="body"/>
@@ -13618,7 +13676,7 @@
   <p:cSld>
     <p:spTree>
       <p:nvGrpSpPr>
-        <p:cNvPr id="138" name="Shape 138"/>
+        <p:cNvPr id="139" name="Shape 139"/>
         <p:cNvGrpSpPr/>
         <p:nvPr/>
       </p:nvGrpSpPr>
@@ -13632,7 +13690,7 @@
       </p:grpSpPr>
       <p:sp>
         <p:nvSpPr>
-          <p:cNvPr id="139" name="Google Shape;139;p14"/>
+          <p:cNvPr id="140" name="Google Shape;140;p14"/>
           <p:cNvSpPr txBox="1"/>
           <p:nvPr>
             <p:ph type="title"/>
@@ -13683,7 +13741,7 @@
   <p:cSld>
     <p:spTree>
       <p:nvGrpSpPr>
-        <p:cNvPr id="241" name="Shape 241"/>
+        <p:cNvPr id="242" name="Shape 242"/>
         <p:cNvGrpSpPr/>
         <p:nvPr/>
       </p:nvGrpSpPr>
@@ -13697,7 +13755,7 @@
       </p:grpSpPr>
       <p:sp>
         <p:nvSpPr>
-          <p:cNvPr id="242" name="Google Shape;242;p32"/>
+          <p:cNvPr id="243" name="Google Shape;243;p32"/>
           <p:cNvSpPr txBox="1"/>
           <p:nvPr>
             <p:ph type="title"/>
@@ -13737,7 +13795,7 @@
       </p:sp>
       <p:sp>
         <p:nvSpPr>
-          <p:cNvPr id="243" name="Google Shape;243;p32"/>
+          <p:cNvPr id="244" name="Google Shape;244;p32"/>
           <p:cNvSpPr txBox="1"/>
           <p:nvPr>
             <p:ph idx="1" type="body"/>
@@ -13799,7 +13857,7 @@
             </a:br>
             <a:r>
               <a:rPr lang="en" sz="1400"/>
-              <a:t>And control the surface area of the bugs.</a:t>
+              <a:t>And control the surface area and the blast radius of the bugs.</a:t>
             </a:r>
             <a:endParaRPr sz="1400"/>
           </a:p>
@@ -13819,10 +13877,14 @@
             </a:r>
             <a:r>
               <a:rPr b="1" lang="en" sz="1400" u="sng"/>
-              <a:t>Assume </a:t>
-            </a:r>
-            <a:r>
-              <a:rPr b="1" i="1" lang="en" sz="1400" u="sng"/>
+              <a:t>Assume</a:t>
+            </a:r>
+            <a:r>
+              <a:rPr b="1" lang="en" sz="1400"/>
+              <a:t> </a:t>
+            </a:r>
+            <a:r>
+              <a:rPr b="1" i="1" lang="en" sz="1400"/>
               <a:t>and </a:t>
             </a:r>
             <a:r>
@@ -13905,7 +13967,7 @@
   <p:cSld>
     <p:spTree>
       <p:nvGrpSpPr>
-        <p:cNvPr id="247" name="Shape 247"/>
+        <p:cNvPr id="248" name="Shape 248"/>
         <p:cNvGrpSpPr/>
         <p:nvPr/>
       </p:nvGrpSpPr>
@@ -13919,7 +13981,7 @@
       </p:grpSpPr>
       <p:sp>
         <p:nvSpPr>
-          <p:cNvPr id="248" name="Google Shape;248;p33"/>
+          <p:cNvPr id="249" name="Google Shape;249;p33"/>
           <p:cNvSpPr txBox="1"/>
           <p:nvPr>
             <p:ph type="title"/>
@@ -13959,7 +14021,7 @@
       </p:sp>
       <p:sp>
         <p:nvSpPr>
-          <p:cNvPr id="249" name="Google Shape;249;p33"/>
+          <p:cNvPr id="250" name="Google Shape;250;p33"/>
           <p:cNvSpPr txBox="1"/>
           <p:nvPr>
             <p:ph idx="1" type="body"/>
@@ -14085,7 +14147,7 @@
   <p:cSld>
     <p:spTree>
       <p:nvGrpSpPr>
-        <p:cNvPr id="253" name="Shape 253"/>
+        <p:cNvPr id="254" name="Shape 254"/>
         <p:cNvGrpSpPr/>
         <p:nvPr/>
       </p:nvGrpSpPr>
@@ -14099,7 +14161,7 @@
       </p:grpSpPr>
       <p:sp>
         <p:nvSpPr>
-          <p:cNvPr id="254" name="Google Shape;254;p34"/>
+          <p:cNvPr id="255" name="Google Shape;255;p34"/>
           <p:cNvSpPr txBox="1"/>
           <p:nvPr>
             <p:ph type="title"/>
@@ -14139,7 +14201,7 @@
       </p:sp>
       <p:sp>
         <p:nvSpPr>
-          <p:cNvPr id="255" name="Google Shape;255;p34"/>
+          <p:cNvPr id="256" name="Google Shape;256;p34"/>
           <p:cNvSpPr txBox="1"/>
           <p:nvPr>
             <p:ph idx="1" type="body"/>
@@ -14178,17 +14240,16 @@
       </p:sp>
       <p:pic>
         <p:nvPicPr>
-          <p:cNvPr id="256" name="Google Shape;256;p34"/>
+          <p:cNvPr id="257" name="Google Shape;257;p34"/>
           <p:cNvPicPr preferRelativeResize="0"/>
           <p:nvPr/>
         </p:nvPicPr>
-        <p:blipFill>
+        <p:blipFill rotWithShape="1">
           <a:blip r:embed="rId3">
             <a:alphaModFix/>
           </a:blip>
-          <a:stretch>
-            <a:fillRect/>
-          </a:stretch>
+          <a:srcRect b="0" l="8697" r="8705" t="0"/>
+          <a:stretch/>
         </p:blipFill>
         <p:spPr>
           <a:xfrm>
@@ -14217,7 +14278,7 @@
   <p:cSld>
     <p:spTree>
       <p:nvGrpSpPr>
-        <p:cNvPr id="260" name="Shape 260"/>
+        <p:cNvPr id="261" name="Shape 261"/>
         <p:cNvGrpSpPr/>
         <p:nvPr/>
       </p:nvGrpSpPr>
@@ -14231,7 +14292,7 @@
       </p:grpSpPr>
       <p:sp>
         <p:nvSpPr>
-          <p:cNvPr id="261" name="Google Shape;261;p35"/>
+          <p:cNvPr id="262" name="Google Shape;262;p35"/>
           <p:cNvSpPr txBox="1"/>
           <p:nvPr>
             <p:ph type="title"/>
@@ -14271,7 +14332,7 @@
       </p:sp>
       <p:sp>
         <p:nvSpPr>
-          <p:cNvPr id="262" name="Google Shape;262;p35"/>
+          <p:cNvPr id="263" name="Google Shape;263;p35"/>
           <p:cNvSpPr txBox="1"/>
           <p:nvPr>
             <p:ph idx="1" type="body"/>
@@ -14310,7 +14371,7 @@
       </p:sp>
       <p:pic>
         <p:nvPicPr>
-          <p:cNvPr id="263" name="Google Shape;263;p35"/>
+          <p:cNvPr id="264" name="Google Shape;264;p35"/>
           <p:cNvPicPr preferRelativeResize="0"/>
           <p:nvPr/>
         </p:nvPicPr>
@@ -14348,7 +14409,7 @@
   <p:cSld>
     <p:spTree>
       <p:nvGrpSpPr>
-        <p:cNvPr id="267" name="Shape 267"/>
+        <p:cNvPr id="268" name="Shape 268"/>
         <p:cNvGrpSpPr/>
         <p:nvPr/>
       </p:nvGrpSpPr>
@@ -14362,7 +14423,7 @@
       </p:grpSpPr>
       <p:sp>
         <p:nvSpPr>
-          <p:cNvPr id="268" name="Google Shape;268;p36"/>
+          <p:cNvPr id="269" name="Google Shape;269;p36"/>
           <p:cNvSpPr txBox="1"/>
           <p:nvPr>
             <p:ph type="title"/>
@@ -14402,7 +14463,7 @@
       </p:sp>
       <p:sp>
         <p:nvSpPr>
-          <p:cNvPr id="269" name="Google Shape;269;p36"/>
+          <p:cNvPr id="270" name="Google Shape;270;p36"/>
           <p:cNvSpPr txBox="1"/>
           <p:nvPr>
             <p:ph idx="1" type="body"/>
@@ -14441,7 +14502,7 @@
       </p:sp>
       <p:pic>
         <p:nvPicPr>
-          <p:cNvPr id="270" name="Google Shape;270;p36"/>
+          <p:cNvPr id="271" name="Google Shape;271;p36"/>
           <p:cNvPicPr preferRelativeResize="0"/>
           <p:nvPr/>
         </p:nvPicPr>
@@ -14479,7 +14540,7 @@
   <p:cSld>
     <p:spTree>
       <p:nvGrpSpPr>
-        <p:cNvPr id="274" name="Shape 274"/>
+        <p:cNvPr id="275" name="Shape 275"/>
         <p:cNvGrpSpPr/>
         <p:nvPr/>
       </p:nvGrpSpPr>
@@ -14493,7 +14554,7 @@
       </p:grpSpPr>
       <p:sp>
         <p:nvSpPr>
-          <p:cNvPr id="275" name="Google Shape;275;p37"/>
+          <p:cNvPr id="276" name="Google Shape;276;p37"/>
           <p:cNvSpPr txBox="1"/>
           <p:nvPr>
             <p:ph type="title"/>
@@ -14533,7 +14594,7 @@
       </p:sp>
       <p:sp>
         <p:nvSpPr>
-          <p:cNvPr id="276" name="Google Shape;276;p37"/>
+          <p:cNvPr id="277" name="Google Shape;277;p37"/>
           <p:cNvSpPr txBox="1"/>
           <p:nvPr>
             <p:ph idx="1" type="body"/>
@@ -14653,7 +14714,7 @@
   <p:cSld>
     <p:spTree>
       <p:nvGrpSpPr>
-        <p:cNvPr id="280" name="Shape 280"/>
+        <p:cNvPr id="281" name="Shape 281"/>
         <p:cNvGrpSpPr/>
         <p:nvPr/>
       </p:nvGrpSpPr>
@@ -14667,7 +14728,7 @@
       </p:grpSpPr>
       <p:sp>
         <p:nvSpPr>
-          <p:cNvPr id="281" name="Google Shape;281;p38"/>
+          <p:cNvPr id="282" name="Google Shape;282;p38"/>
           <p:cNvSpPr txBox="1"/>
           <p:nvPr>
             <p:ph type="title"/>
@@ -14707,7 +14768,7 @@
       </p:sp>
       <p:sp>
         <p:nvSpPr>
-          <p:cNvPr id="282" name="Google Shape;282;p38"/>
+          <p:cNvPr id="283" name="Google Shape;283;p38"/>
           <p:cNvSpPr txBox="1"/>
           <p:nvPr>
             <p:ph idx="1" type="body"/>
@@ -14841,7 +14902,7 @@
   <p:cSld>
     <p:spTree>
       <p:nvGrpSpPr>
-        <p:cNvPr id="286" name="Shape 286"/>
+        <p:cNvPr id="287" name="Shape 287"/>
         <p:cNvGrpSpPr/>
         <p:nvPr/>
       </p:nvGrpSpPr>
@@ -14855,7 +14916,7 @@
       </p:grpSpPr>
       <p:sp>
         <p:nvSpPr>
-          <p:cNvPr id="287" name="Google Shape;287;p39"/>
+          <p:cNvPr id="288" name="Google Shape;288;p39"/>
           <p:cNvSpPr txBox="1"/>
           <p:nvPr>
             <p:ph type="title"/>
@@ -14895,7 +14956,7 @@
       </p:sp>
       <p:sp>
         <p:nvSpPr>
-          <p:cNvPr id="288" name="Google Shape;288;p39"/>
+          <p:cNvPr id="289" name="Google Shape;289;p39"/>
           <p:cNvSpPr txBox="1"/>
           <p:nvPr>
             <p:ph idx="1" type="body"/>
@@ -15074,7 +15135,7 @@
   <p:cSld>
     <p:spTree>
       <p:nvGrpSpPr>
-        <p:cNvPr id="292" name="Shape 292"/>
+        <p:cNvPr id="293" name="Shape 293"/>
         <p:cNvGrpSpPr/>
         <p:nvPr/>
       </p:nvGrpSpPr>
@@ -15088,7 +15149,7 @@
       </p:grpSpPr>
       <p:sp>
         <p:nvSpPr>
-          <p:cNvPr id="293" name="Google Shape;293;p40"/>
+          <p:cNvPr id="294" name="Google Shape;294;p40"/>
           <p:cNvSpPr txBox="1"/>
           <p:nvPr>
             <p:ph type="title"/>
@@ -15128,7 +15189,7 @@
       </p:sp>
       <p:sp>
         <p:nvSpPr>
-          <p:cNvPr id="294" name="Google Shape;294;p40"/>
+          <p:cNvPr id="295" name="Google Shape;295;p40"/>
           <p:cNvSpPr txBox="1"/>
           <p:nvPr>
             <p:ph idx="1" type="body"/>
@@ -15266,7 +15327,7 @@
   <p:cSld>
     <p:spTree>
       <p:nvGrpSpPr>
-        <p:cNvPr id="143" name="Shape 143"/>
+        <p:cNvPr id="144" name="Shape 144"/>
         <p:cNvGrpSpPr/>
         <p:nvPr/>
       </p:nvGrpSpPr>
@@ -15280,7 +15341,7 @@
       </p:grpSpPr>
       <p:sp>
         <p:nvSpPr>
-          <p:cNvPr id="144" name="Google Shape;144;p15"/>
+          <p:cNvPr id="145" name="Google Shape;145;p15"/>
           <p:cNvSpPr txBox="1"/>
           <p:nvPr>
             <p:ph type="title"/>
@@ -15338,7 +15399,7 @@
   <p:cSld>
     <p:spTree>
       <p:nvGrpSpPr>
-        <p:cNvPr id="148" name="Shape 148"/>
+        <p:cNvPr id="149" name="Shape 149"/>
         <p:cNvGrpSpPr/>
         <p:nvPr/>
       </p:nvGrpSpPr>
@@ -15352,7 +15413,7 @@
       </p:grpSpPr>
       <p:sp>
         <p:nvSpPr>
-          <p:cNvPr id="149" name="Google Shape;149;p16"/>
+          <p:cNvPr id="150" name="Google Shape;150;p16"/>
           <p:cNvSpPr txBox="1"/>
           <p:nvPr>
             <p:ph type="title"/>
@@ -15360,8 +15421,8 @@
         </p:nvSpPr>
         <p:spPr>
           <a:xfrm>
-            <a:off x="823850" y="2053000"/>
-            <a:ext cx="4587000" cy="1148700"/>
+            <a:off x="823850" y="1795825"/>
+            <a:ext cx="4587000" cy="1812900"/>
           </a:xfrm>
           <a:prstGeom prst="rect">
             <a:avLst/>
@@ -15369,7 +15430,7 @@
         </p:spPr>
         <p:txBody>
           <a:bodyPr anchorCtr="0" anchor="ctr" bIns="91425" lIns="91425" spcFirstLastPara="1" rIns="91425" wrap="square" tIns="91425">
-            <a:normAutofit fontScale="90000"/>
+            <a:normAutofit/>
           </a:bodyPr>
           <a:lstStyle/>
           <a:p>
@@ -15420,7 +15481,7 @@
   <p:cSld>
     <p:spTree>
       <p:nvGrpSpPr>
-        <p:cNvPr id="153" name="Shape 153"/>
+        <p:cNvPr id="154" name="Shape 154"/>
         <p:cNvGrpSpPr/>
         <p:nvPr/>
       </p:nvGrpSpPr>
@@ -15434,7 +15495,7 @@
       </p:grpSpPr>
       <p:sp>
         <p:nvSpPr>
-          <p:cNvPr id="154" name="Google Shape;154;p17"/>
+          <p:cNvPr id="155" name="Google Shape;155;p17"/>
           <p:cNvSpPr txBox="1"/>
           <p:nvPr>
             <p:ph type="title"/>
@@ -15485,7 +15546,7 @@
   <p:cSld>
     <p:spTree>
       <p:nvGrpSpPr>
-        <p:cNvPr id="158" name="Shape 158"/>
+        <p:cNvPr id="159" name="Shape 159"/>
         <p:cNvGrpSpPr/>
         <p:nvPr/>
       </p:nvGrpSpPr>
@@ -15499,7 +15560,7 @@
       </p:grpSpPr>
       <p:sp>
         <p:nvSpPr>
-          <p:cNvPr id="159" name="Google Shape;159;p18"/>
+          <p:cNvPr id="160" name="Google Shape;160;p18"/>
           <p:cNvSpPr txBox="1"/>
           <p:nvPr>
             <p:ph type="title"/>
@@ -15550,7 +15611,7 @@
   <p:cSld>
     <p:spTree>
       <p:nvGrpSpPr>
-        <p:cNvPr id="163" name="Shape 163"/>
+        <p:cNvPr id="164" name="Shape 164"/>
         <p:cNvGrpSpPr/>
         <p:nvPr/>
       </p:nvGrpSpPr>
@@ -15564,7 +15625,7 @@
       </p:grpSpPr>
       <p:sp>
         <p:nvSpPr>
-          <p:cNvPr id="164" name="Google Shape;164;p19"/>
+          <p:cNvPr id="165" name="Google Shape;165;p19"/>
           <p:cNvSpPr txBox="1"/>
           <p:nvPr>
             <p:ph type="title"/>
@@ -15604,7 +15665,7 @@
       </p:sp>
       <p:sp>
         <p:nvSpPr>
-          <p:cNvPr id="165" name="Google Shape;165;p19"/>
+          <p:cNvPr id="166" name="Google Shape;166;p19"/>
           <p:cNvSpPr txBox="1"/>
           <p:nvPr>
             <p:ph idx="1" type="body"/>
@@ -15700,7 +15761,7 @@
   <p:cSld>
     <p:spTree>
       <p:nvGrpSpPr>
-        <p:cNvPr id="169" name="Shape 169"/>
+        <p:cNvPr id="170" name="Shape 170"/>
         <p:cNvGrpSpPr/>
         <p:nvPr/>
       </p:nvGrpSpPr>
@@ -15714,7 +15775,7 @@
       </p:grpSpPr>
       <p:sp>
         <p:nvSpPr>
-          <p:cNvPr id="170" name="Google Shape;170;p20"/>
+          <p:cNvPr id="171" name="Google Shape;171;p20"/>
           <p:cNvSpPr txBox="1"/>
           <p:nvPr>
             <p:ph type="title"/>
@@ -15754,7 +15815,7 @@
       </p:sp>
       <p:sp>
         <p:nvSpPr>
-          <p:cNvPr id="171" name="Google Shape;171;p20"/>
+          <p:cNvPr id="172" name="Google Shape;172;p20"/>
           <p:cNvSpPr txBox="1"/>
           <p:nvPr>
             <p:ph idx="1" type="body"/>
@@ -15856,7 +15917,7 @@
   <p:cSld>
     <p:spTree>
       <p:nvGrpSpPr>
-        <p:cNvPr id="175" name="Shape 175"/>
+        <p:cNvPr id="176" name="Shape 176"/>
         <p:cNvGrpSpPr/>
         <p:nvPr/>
       </p:nvGrpSpPr>
@@ -15870,7 +15931,7 @@
       </p:grpSpPr>
       <p:sp>
         <p:nvSpPr>
-          <p:cNvPr id="176" name="Google Shape;176;p21"/>
+          <p:cNvPr id="177" name="Google Shape;177;p21"/>
           <p:cNvSpPr txBox="1"/>
           <p:nvPr>
             <p:ph type="title"/>
@@ -15910,7 +15971,7 @@
       </p:sp>
       <p:sp>
         <p:nvSpPr>
-          <p:cNvPr id="177" name="Google Shape;177;p21"/>
+          <p:cNvPr id="178" name="Google Shape;178;p21"/>
           <p:cNvSpPr txBox="1"/>
           <p:nvPr>
             <p:ph idx="1" type="body"/>

</xml_diff>